<commit_message>
Update Module flow chart - documentation
</commit_message>
<xml_diff>
--- a/documentation/CEDS Module Flow Chart.pptx
+++ b/documentation/CEDS Module Flow Chart.pptx
@@ -288,7 +288,7 @@
           <a:p>
             <a:fld id="{B0D19113-2CE2-D44F-AE8E-C04F05A7C2E1}" type="datetimeFigureOut">
               <a:rPr lang="en-US" smtClean="0"/>
-              <a:t>8/14/15</a:t>
+              <a:t>6/22/16</a:t>
             </a:fld>
             <a:endParaRPr lang="en-US"/>
           </a:p>
@@ -458,7 +458,7 @@
           <a:p>
             <a:fld id="{B0D19113-2CE2-D44F-AE8E-C04F05A7C2E1}" type="datetimeFigureOut">
               <a:rPr lang="en-US" smtClean="0"/>
-              <a:t>8/14/15</a:t>
+              <a:t>6/22/16</a:t>
             </a:fld>
             <a:endParaRPr lang="en-US"/>
           </a:p>
@@ -638,7 +638,7 @@
           <a:p>
             <a:fld id="{B0D19113-2CE2-D44F-AE8E-C04F05A7C2E1}" type="datetimeFigureOut">
               <a:rPr lang="en-US" smtClean="0"/>
-              <a:t>8/14/15</a:t>
+              <a:t>6/22/16</a:t>
             </a:fld>
             <a:endParaRPr lang="en-US"/>
           </a:p>
@@ -808,7 +808,7 @@
           <a:p>
             <a:fld id="{B0D19113-2CE2-D44F-AE8E-C04F05A7C2E1}" type="datetimeFigureOut">
               <a:rPr lang="en-US" smtClean="0"/>
-              <a:t>8/14/15</a:t>
+              <a:t>6/22/16</a:t>
             </a:fld>
             <a:endParaRPr lang="en-US"/>
           </a:p>
@@ -1054,7 +1054,7 @@
           <a:p>
             <a:fld id="{B0D19113-2CE2-D44F-AE8E-C04F05A7C2E1}" type="datetimeFigureOut">
               <a:rPr lang="en-US" smtClean="0"/>
-              <a:t>8/14/15</a:t>
+              <a:t>6/22/16</a:t>
             </a:fld>
             <a:endParaRPr lang="en-US"/>
           </a:p>
@@ -1342,7 +1342,7 @@
           <a:p>
             <a:fld id="{B0D19113-2CE2-D44F-AE8E-C04F05A7C2E1}" type="datetimeFigureOut">
               <a:rPr lang="en-US" smtClean="0"/>
-              <a:t>8/14/15</a:t>
+              <a:t>6/22/16</a:t>
             </a:fld>
             <a:endParaRPr lang="en-US"/>
           </a:p>
@@ -1764,7 +1764,7 @@
           <a:p>
             <a:fld id="{B0D19113-2CE2-D44F-AE8E-C04F05A7C2E1}" type="datetimeFigureOut">
               <a:rPr lang="en-US" smtClean="0"/>
-              <a:t>8/14/15</a:t>
+              <a:t>6/22/16</a:t>
             </a:fld>
             <a:endParaRPr lang="en-US"/>
           </a:p>
@@ -1882,7 +1882,7 @@
           <a:p>
             <a:fld id="{B0D19113-2CE2-D44F-AE8E-C04F05A7C2E1}" type="datetimeFigureOut">
               <a:rPr lang="en-US" smtClean="0"/>
-              <a:t>8/14/15</a:t>
+              <a:t>6/22/16</a:t>
             </a:fld>
             <a:endParaRPr lang="en-US"/>
           </a:p>
@@ -1977,7 +1977,7 @@
           <a:p>
             <a:fld id="{B0D19113-2CE2-D44F-AE8E-C04F05A7C2E1}" type="datetimeFigureOut">
               <a:rPr lang="en-US" smtClean="0"/>
-              <a:t>8/14/15</a:t>
+              <a:t>6/22/16</a:t>
             </a:fld>
             <a:endParaRPr lang="en-US"/>
           </a:p>
@@ -2254,7 +2254,7 @@
           <a:p>
             <a:fld id="{B0D19113-2CE2-D44F-AE8E-C04F05A7C2E1}" type="datetimeFigureOut">
               <a:rPr lang="en-US" smtClean="0"/>
-              <a:t>8/14/15</a:t>
+              <a:t>6/22/16</a:t>
             </a:fld>
             <a:endParaRPr lang="en-US"/>
           </a:p>
@@ -2507,7 +2507,7 @@
           <a:p>
             <a:fld id="{B0D19113-2CE2-D44F-AE8E-C04F05A7C2E1}" type="datetimeFigureOut">
               <a:rPr lang="en-US" smtClean="0"/>
-              <a:t>8/14/15</a:t>
+              <a:t>6/22/16</a:t>
             </a:fld>
             <a:endParaRPr lang="en-US"/>
           </a:p>
@@ -2720,7 +2720,7 @@
           <a:p>
             <a:fld id="{B0D19113-2CE2-D44F-AE8E-C04F05A7C2E1}" type="datetimeFigureOut">
               <a:rPr lang="en-US" smtClean="0"/>
-              <a:t>8/14/15</a:t>
+              <a:t>6/22/16</a:t>
             </a:fld>
             <a:endParaRPr lang="en-US"/>
           </a:p>
@@ -3106,8 +3106,8 @@
         </p:nvCxnSpPr>
         <p:spPr>
           <a:xfrm>
-            <a:off x="2692388" y="3645983"/>
-            <a:ext cx="2581225" cy="2150371"/>
+            <a:off x="2259422" y="3376315"/>
+            <a:ext cx="1801888" cy="2449571"/>
           </a:xfrm>
           <a:prstGeom prst="straightConnector1">
             <a:avLst/>
@@ -3143,8 +3143,8 @@
         </p:nvSpPr>
         <p:spPr>
           <a:xfrm>
-            <a:off x="284746" y="260819"/>
-            <a:ext cx="2206650" cy="1702997"/>
+            <a:off x="188531" y="172739"/>
+            <a:ext cx="1610683" cy="1376385"/>
           </a:xfrm>
           <a:prstGeom prst="rect">
             <a:avLst/>
@@ -3179,11 +3179,10 @@
           <a:p>
             <a:pPr algn="ctr"/>
             <a:r>
-              <a:rPr lang="en-US" sz="1300" b="1" dirty="0" smtClean="0">
+              <a:rPr lang="en-US" sz="1200" b="1" dirty="0" smtClean="0">
                 <a:solidFill>
                   <a:schemeClr val="tx1"/>
                 </a:solidFill>
-                <a:latin typeface="Times New Roman"/>
                 <a:cs typeface="Times New Roman"/>
               </a:rPr>
               <a:t>A. Activity Data</a:t>
@@ -3192,21 +3191,19 @@
           <a:p>
             <a:pPr algn="ctr"/>
             <a:r>
-              <a:rPr lang="en-US" sz="1300" b="1" dirty="0" smtClean="0">
+              <a:rPr lang="en-US" sz="1200" b="1" dirty="0" smtClean="0">
                 <a:solidFill>
                   <a:schemeClr val="tx1"/>
                 </a:solidFill>
-                <a:latin typeface="Times New Roman"/>
                 <a:cs typeface="Times New Roman"/>
               </a:rPr>
               <a:t> </a:t>
             </a:r>
             <a:r>
-              <a:rPr lang="en-US" sz="1300" dirty="0" smtClean="0">
+              <a:rPr lang="en-US" sz="1200" dirty="0" smtClean="0">
                 <a:solidFill>
                   <a:schemeClr val="tx1"/>
                 </a:solidFill>
-                <a:latin typeface="Times New Roman"/>
                 <a:cs typeface="Times New Roman"/>
               </a:rPr>
               <a:t>fuel consumption, processing activity, and other drivers</a:t>
@@ -3214,31 +3211,46 @@
           </a:p>
           <a:p>
             <a:pPr algn="ctr"/>
-            <a:endParaRPr lang="en-US" sz="1300" dirty="0" smtClean="0">
+            <a:endParaRPr lang="en-US" sz="1200" dirty="0" smtClean="0">
               <a:solidFill>
                 <a:schemeClr val="tx1"/>
               </a:solidFill>
-              <a:latin typeface="Times New Roman"/>
               <a:cs typeface="Times New Roman"/>
             </a:endParaRPr>
           </a:p>
           <a:p>
             <a:pPr algn="ctr"/>
             <a:r>
-              <a:rPr lang="en-US" sz="1300" dirty="0" smtClean="0">
+              <a:rPr lang="en-US" sz="1200" dirty="0" smtClean="0">
                 <a:solidFill>
                   <a:schemeClr val="tx1"/>
                 </a:solidFill>
-                <a:latin typeface="Times New Roman"/>
                 <a:cs typeface="Times New Roman"/>
               </a:rPr>
-              <a:t>(1750 or 1850 – 20xx)</a:t>
-            </a:r>
-            <a:endParaRPr lang="en-US" sz="1300" dirty="0">
+              <a:t>(</a:t>
+            </a:r>
+            <a:r>
+              <a:rPr lang="en-US" sz="1200" dirty="0" smtClean="0">
+                <a:solidFill>
+                  <a:schemeClr val="tx1"/>
+                </a:solidFill>
+                <a:cs typeface="Times New Roman"/>
+              </a:rPr>
+              <a:t>1750 – </a:t>
+            </a:r>
+            <a:r>
+              <a:rPr lang="en-US" sz="1200" dirty="0" smtClean="0">
+                <a:solidFill>
+                  <a:schemeClr val="tx1"/>
+                </a:solidFill>
+                <a:cs typeface="Times New Roman"/>
+              </a:rPr>
+              <a:t>20xx)</a:t>
+            </a:r>
+            <a:endParaRPr lang="en-US" sz="1200" dirty="0">
               <a:solidFill>
                 <a:schemeClr val="tx1"/>
               </a:solidFill>
-              <a:latin typeface="Times New Roman"/>
               <a:cs typeface="Times New Roman"/>
             </a:endParaRPr>
           </a:p>
@@ -3252,7 +3264,7 @@
         </p:nvSpPr>
         <p:spPr>
           <a:xfrm>
-            <a:off x="3449382" y="1718962"/>
+            <a:off x="2812466" y="1539228"/>
             <a:ext cx="1477504" cy="1032623"/>
           </a:xfrm>
           <a:prstGeom prst="rect">
@@ -3288,22 +3300,22 @@
           <a:p>
             <a:pPr algn="ctr"/>
             <a:r>
-              <a:rPr lang="en-US" sz="1300" b="1" dirty="0">
+              <a:rPr lang="en-US" sz="1200" b="1" dirty="0">
                 <a:solidFill>
                   <a:srgbClr val="000000"/>
                 </a:solidFill>
-                <a:latin typeface="Times New Roman"/>
-                <a:cs typeface="Times New Roman"/>
+                <a:latin typeface="Calibri"/>
+                <a:cs typeface="Calibri"/>
               </a:rPr>
               <a:t>E</a:t>
             </a:r>
             <a:r>
-              <a:rPr lang="en-US" sz="1300" b="1" dirty="0" smtClean="0">
+              <a:rPr lang="en-US" sz="1200" b="1" dirty="0" smtClean="0">
                 <a:solidFill>
                   <a:srgbClr val="000000"/>
                 </a:solidFill>
-                <a:latin typeface="Times New Roman"/>
-                <a:cs typeface="Times New Roman"/>
+                <a:latin typeface="Calibri"/>
+                <a:cs typeface="Calibri"/>
               </a:rPr>
               <a:t>. Emissions Inventory estimates </a:t>
             </a:r>
@@ -3311,21 +3323,21 @@
           <a:p>
             <a:pPr algn="ctr"/>
             <a:r>
-              <a:rPr lang="en-US" sz="1300" i="1" dirty="0" smtClean="0">
+              <a:rPr lang="en-US" sz="1200" i="1" dirty="0" smtClean="0">
                 <a:solidFill>
                   <a:srgbClr val="000000"/>
                 </a:solidFill>
-                <a:latin typeface="Times New Roman"/>
-                <a:cs typeface="Times New Roman"/>
+                <a:latin typeface="Calibri"/>
+                <a:cs typeface="Calibri"/>
               </a:rPr>
               <a:t>where available</a:t>
             </a:r>
-            <a:endParaRPr lang="en-US" sz="1300" i="1" dirty="0">
+            <a:endParaRPr lang="en-US" sz="1200" i="1" dirty="0">
               <a:solidFill>
                 <a:srgbClr val="000000"/>
               </a:solidFill>
-              <a:latin typeface="Times New Roman"/>
-              <a:cs typeface="Times New Roman"/>
+              <a:latin typeface="Calibri"/>
+              <a:cs typeface="Calibri"/>
             </a:endParaRPr>
           </a:p>
         </p:txBody>
@@ -3338,7 +3350,90 @@
         </p:nvSpPr>
         <p:spPr>
           <a:xfrm>
-            <a:off x="853273" y="2925015"/>
+            <a:off x="642689" y="2751585"/>
+            <a:ext cx="1616733" cy="1249459"/>
+          </a:xfrm>
+          <a:prstGeom prst="rect">
+            <a:avLst/>
+          </a:prstGeom>
+          <a:solidFill>
+            <a:schemeClr val="accent4">
+              <a:lumMod val="20000"/>
+              <a:lumOff val="80000"/>
+            </a:schemeClr>
+          </a:solidFill>
+          <a:ln/>
+        </p:spPr>
+        <p:style>
+          <a:lnRef idx="2">
+            <a:schemeClr val="accent4">
+              <a:shade val="50000"/>
+            </a:schemeClr>
+          </a:lnRef>
+          <a:fillRef idx="1">
+            <a:schemeClr val="accent4"/>
+          </a:fillRef>
+          <a:effectRef idx="0">
+            <a:schemeClr val="accent4"/>
+          </a:effectRef>
+          <a:fontRef idx="minor">
+            <a:schemeClr val="lt1"/>
+          </a:fontRef>
+        </p:style>
+        <p:txBody>
+          <a:bodyPr rtlCol="0" anchor="ctr"/>
+          <a:lstStyle/>
+          <a:p>
+            <a:pPr algn="ctr"/>
+            <a:r>
+              <a:rPr lang="en-US" sz="1200" b="1" dirty="0" smtClean="0">
+                <a:solidFill>
+                  <a:schemeClr val="tx1"/>
+                </a:solidFill>
+                <a:latin typeface="Calibri"/>
+                <a:cs typeface="Calibri"/>
+              </a:rPr>
+              <a:t>B. Default Emission Factors</a:t>
+            </a:r>
+            <a:endParaRPr lang="en-US" sz="1200" dirty="0">
+              <a:solidFill>
+                <a:schemeClr val="tx1"/>
+              </a:solidFill>
+              <a:latin typeface="Calibri"/>
+              <a:cs typeface="Calibri"/>
+            </a:endParaRPr>
+          </a:p>
+          <a:p>
+            <a:pPr algn="ctr"/>
+            <a:r>
+              <a:rPr lang="en-US" sz="1200" dirty="0" smtClean="0">
+                <a:solidFill>
+                  <a:schemeClr val="tx1"/>
+                </a:solidFill>
+                <a:latin typeface="Calibri"/>
+                <a:cs typeface="Calibri"/>
+              </a:rPr>
+              <a:t>(primarily combustion) by fuel and sector</a:t>
+            </a:r>
+            <a:endParaRPr lang="en-US" sz="1200" dirty="0">
+              <a:solidFill>
+                <a:schemeClr val="tx1"/>
+              </a:solidFill>
+              <a:latin typeface="Calibri"/>
+              <a:cs typeface="Calibri"/>
+            </a:endParaRPr>
+          </a:p>
+        </p:txBody>
+      </p:sp>
+      <p:sp>
+        <p:nvSpPr>
+          <p:cNvPr id="11" name="Rectangle 10"/>
+          <p:cNvSpPr/>
+          <p:nvPr/>
+        </p:nvSpPr>
+        <p:spPr>
+          <a:xfrm>
+            <a:off x="738904" y="5104918"/>
             <a:ext cx="1839115" cy="1441935"/>
           </a:xfrm>
           <a:prstGeom prst="rect">
@@ -3374,127 +3469,44 @@
           <a:p>
             <a:pPr algn="ctr"/>
             <a:r>
-              <a:rPr lang="en-US" sz="1300" b="1" dirty="0" smtClean="0">
+              <a:rPr lang="en-US" sz="1200" b="1" dirty="0">
                 <a:solidFill>
                   <a:schemeClr val="tx1"/>
                 </a:solidFill>
-                <a:latin typeface="Times New Roman"/>
-                <a:cs typeface="Times New Roman"/>
+                <a:latin typeface="Calibri"/>
+                <a:cs typeface="Calibri"/>
               </a:rPr>
-              <a:t>B. Default Emission Factors</a:t>
-            </a:r>
-            <a:endParaRPr lang="en-US" sz="1300" dirty="0">
+              <a:t>C</a:t>
+            </a:r>
+            <a:r>
+              <a:rPr lang="en-US" sz="1200" b="1" dirty="0" smtClean="0">
+                <a:solidFill>
+                  <a:schemeClr val="tx1"/>
+                </a:solidFill>
+                <a:latin typeface="Calibri"/>
+                <a:cs typeface="Calibri"/>
+              </a:rPr>
+              <a:t>. Default Non Combustion Emissions Factors</a:t>
+            </a:r>
+          </a:p>
+          <a:p>
+            <a:pPr algn="ctr"/>
+            <a:r>
+              <a:rPr lang="en-US" sz="1200" dirty="0" smtClean="0">
+                <a:solidFill>
+                  <a:schemeClr val="tx1"/>
+                </a:solidFill>
+                <a:latin typeface="Calibri"/>
+                <a:cs typeface="Calibri"/>
+              </a:rPr>
+              <a:t>Bottom Up Emissions/ Emission Factors by fuel and sector. </a:t>
+            </a:r>
+            <a:endParaRPr lang="en-US" sz="1200" dirty="0">
               <a:solidFill>
                 <a:schemeClr val="tx1"/>
               </a:solidFill>
-              <a:latin typeface="Times New Roman"/>
-              <a:cs typeface="Times New Roman"/>
-            </a:endParaRPr>
-          </a:p>
-          <a:p>
-            <a:pPr algn="ctr"/>
-            <a:r>
-              <a:rPr lang="en-US" sz="1300" dirty="0" smtClean="0">
-                <a:solidFill>
-                  <a:schemeClr val="tx1"/>
-                </a:solidFill>
-                <a:latin typeface="Times New Roman"/>
-                <a:cs typeface="Times New Roman"/>
-              </a:rPr>
-              <a:t>(primarily combustion) by fuel and sector</a:t>
-            </a:r>
-            <a:endParaRPr lang="en-US" sz="1300" dirty="0">
-              <a:solidFill>
-                <a:schemeClr val="tx1"/>
-              </a:solidFill>
-              <a:latin typeface="Times New Roman"/>
-              <a:cs typeface="Times New Roman"/>
-            </a:endParaRPr>
-          </a:p>
-        </p:txBody>
-      </p:sp>
-      <p:sp>
-        <p:nvSpPr>
-          <p:cNvPr id="11" name="Rectangle 10"/>
-          <p:cNvSpPr/>
-          <p:nvPr/>
-        </p:nvSpPr>
-        <p:spPr>
-          <a:xfrm>
-            <a:off x="853273" y="5071217"/>
-            <a:ext cx="1839115" cy="1441935"/>
-          </a:xfrm>
-          <a:prstGeom prst="rect">
-            <a:avLst/>
-          </a:prstGeom>
-          <a:solidFill>
-            <a:schemeClr val="accent4">
-              <a:lumMod val="20000"/>
-              <a:lumOff val="80000"/>
-            </a:schemeClr>
-          </a:solidFill>
-          <a:ln/>
-        </p:spPr>
-        <p:style>
-          <a:lnRef idx="2">
-            <a:schemeClr val="accent4">
-              <a:shade val="50000"/>
-            </a:schemeClr>
-          </a:lnRef>
-          <a:fillRef idx="1">
-            <a:schemeClr val="accent4"/>
-          </a:fillRef>
-          <a:effectRef idx="0">
-            <a:schemeClr val="accent4"/>
-          </a:effectRef>
-          <a:fontRef idx="minor">
-            <a:schemeClr val="lt1"/>
-          </a:fontRef>
-        </p:style>
-        <p:txBody>
-          <a:bodyPr rtlCol="0" anchor="ctr"/>
-          <a:lstStyle/>
-          <a:p>
-            <a:pPr algn="ctr"/>
-            <a:r>
-              <a:rPr lang="en-US" sz="1300" b="1" dirty="0">
-                <a:solidFill>
-                  <a:schemeClr val="tx1"/>
-                </a:solidFill>
-                <a:latin typeface="Times New Roman"/>
-                <a:cs typeface="Times New Roman"/>
-              </a:rPr>
-              <a:t>C</a:t>
-            </a:r>
-            <a:r>
-              <a:rPr lang="en-US" sz="1300" b="1" dirty="0" smtClean="0">
-                <a:solidFill>
-                  <a:schemeClr val="tx1"/>
-                </a:solidFill>
-                <a:latin typeface="Times New Roman"/>
-                <a:cs typeface="Times New Roman"/>
-              </a:rPr>
-              <a:t>. Default Non Combustion Emissions Factors</a:t>
-            </a:r>
-          </a:p>
-          <a:p>
-            <a:pPr algn="ctr"/>
-            <a:r>
-              <a:rPr lang="en-US" sz="1300" dirty="0" smtClean="0">
-                <a:solidFill>
-                  <a:schemeClr val="tx1"/>
-                </a:solidFill>
-                <a:latin typeface="Times New Roman"/>
-                <a:cs typeface="Times New Roman"/>
-              </a:rPr>
-              <a:t>Bottom Up Emissions/ Emission Factors by fuel and sector. </a:t>
-            </a:r>
-            <a:endParaRPr lang="en-US" sz="1300" dirty="0">
-              <a:solidFill>
-                <a:schemeClr val="tx1"/>
-              </a:solidFill>
-              <a:latin typeface="Times New Roman"/>
-              <a:cs typeface="Times New Roman"/>
+              <a:latin typeface="Calibri"/>
+              <a:cs typeface="Calibri"/>
             </a:endParaRPr>
           </a:p>
         </p:txBody>
@@ -3510,8 +3522,8 @@
         </p:nvCxnSpPr>
         <p:spPr>
           <a:xfrm>
-            <a:off x="2491396" y="1112318"/>
-            <a:ext cx="890128" cy="2827684"/>
+            <a:off x="1799214" y="860932"/>
+            <a:ext cx="1361016" cy="2847483"/>
           </a:xfrm>
           <a:prstGeom prst="straightConnector1">
             <a:avLst/>
@@ -3547,7 +3559,7 @@
         </p:nvSpPr>
         <p:spPr>
           <a:xfrm>
-            <a:off x="3381524" y="3238793"/>
+            <a:off x="3160230" y="3007206"/>
             <a:ext cx="1591571" cy="1402418"/>
           </a:xfrm>
           <a:prstGeom prst="rect">
@@ -3583,12 +3595,12 @@
           <a:p>
             <a:pPr algn="ctr"/>
             <a:r>
-              <a:rPr lang="en-US" sz="1300" b="1" dirty="0" smtClean="0">
+              <a:rPr lang="en-US" sz="1200" b="1" dirty="0" smtClean="0">
                 <a:solidFill>
                   <a:schemeClr val="tx1"/>
                 </a:solidFill>
-                <a:latin typeface="Times New Roman"/>
-                <a:cs typeface="Times New Roman"/>
+                <a:latin typeface="Calibri"/>
+                <a:cs typeface="Calibri"/>
               </a:rPr>
               <a:t>D. Default Emission Estimates </a:t>
             </a:r>
@@ -3596,21 +3608,21 @@
           <a:p>
             <a:pPr algn="ctr"/>
             <a:r>
-              <a:rPr lang="en-US" sz="1300" dirty="0" smtClean="0">
+              <a:rPr lang="en-US" sz="1200" dirty="0" smtClean="0">
                 <a:solidFill>
                   <a:schemeClr val="tx1"/>
                 </a:solidFill>
-                <a:latin typeface="Times New Roman"/>
-                <a:cs typeface="Times New Roman"/>
+                <a:latin typeface="Calibri"/>
+                <a:cs typeface="Calibri"/>
               </a:rPr>
               <a:t>by year, country, fuel, and sector</a:t>
             </a:r>
-            <a:endParaRPr lang="en-US" sz="1300" dirty="0">
+            <a:endParaRPr lang="en-US" sz="1200" dirty="0">
               <a:solidFill>
                 <a:schemeClr val="tx1"/>
               </a:solidFill>
-              <a:latin typeface="Times New Roman"/>
-              <a:cs typeface="Times New Roman"/>
+              <a:latin typeface="Calibri"/>
+              <a:cs typeface="Calibri"/>
             </a:endParaRPr>
           </a:p>
         </p:txBody>
@@ -3626,8 +3638,8 @@
         </p:nvCxnSpPr>
         <p:spPr>
           <a:xfrm>
-            <a:off x="2692388" y="3645983"/>
-            <a:ext cx="689136" cy="294019"/>
+            <a:off x="2259422" y="3376315"/>
+            <a:ext cx="900808" cy="332100"/>
           </a:xfrm>
           <a:prstGeom prst="straightConnector1">
             <a:avLst/>
@@ -3666,8 +3678,8 @@
         </p:nvCxnSpPr>
         <p:spPr>
           <a:xfrm flipV="1">
-            <a:off x="2692388" y="3940002"/>
-            <a:ext cx="689136" cy="1852183"/>
+            <a:off x="2578019" y="3708415"/>
+            <a:ext cx="582211" cy="2117471"/>
           </a:xfrm>
           <a:prstGeom prst="straightConnector1">
             <a:avLst/>
@@ -3703,8 +3715,8 @@
         </p:nvSpPr>
         <p:spPr>
           <a:xfrm>
-            <a:off x="5527585" y="2547279"/>
-            <a:ext cx="1279627" cy="1402418"/>
+            <a:off x="5046511" y="1578770"/>
+            <a:ext cx="1279627" cy="1197738"/>
           </a:xfrm>
           <a:prstGeom prst="rect">
             <a:avLst/>
@@ -3739,42 +3751,42 @@
           <a:p>
             <a:pPr algn="ctr"/>
             <a:r>
-              <a:rPr lang="en-US" sz="1300" b="1" dirty="0" smtClean="0">
+              <a:rPr lang="en-US" sz="1200" b="1" dirty="0" smtClean="0">
                 <a:solidFill>
                   <a:srgbClr val="000000"/>
                 </a:solidFill>
-                <a:latin typeface="Times New Roman"/>
-                <a:cs typeface="Times New Roman"/>
+                <a:latin typeface="Calibri"/>
+                <a:cs typeface="Calibri"/>
               </a:rPr>
               <a:t>F. Emission</a:t>
             </a:r>
             <a:r>
-              <a:rPr lang="en-US" sz="1300" b="1" dirty="0">
+              <a:rPr lang="en-US" sz="1200" b="1" dirty="0">
                 <a:solidFill>
                   <a:srgbClr val="000000"/>
                 </a:solidFill>
-                <a:latin typeface="Times New Roman"/>
-                <a:cs typeface="Times New Roman"/>
+                <a:latin typeface="Calibri"/>
+                <a:cs typeface="Calibri"/>
               </a:rPr>
               <a:t> </a:t>
             </a:r>
             <a:r>
-              <a:rPr lang="en-US" sz="1300" b="1" dirty="0" smtClean="0">
+              <a:rPr lang="en-US" sz="1200" b="1" dirty="0" smtClean="0">
                 <a:solidFill>
                   <a:srgbClr val="000000"/>
                 </a:solidFill>
-                <a:latin typeface="Times New Roman"/>
-                <a:cs typeface="Times New Roman"/>
+                <a:latin typeface="Calibri"/>
+                <a:cs typeface="Calibri"/>
               </a:rPr>
               <a:t>Factor Scaling</a:t>
             </a:r>
             <a:r>
-              <a:rPr lang="en-US" sz="1300" dirty="0" smtClean="0">
+              <a:rPr lang="en-US" sz="1200" dirty="0" smtClean="0">
                 <a:solidFill>
                   <a:srgbClr val="000000"/>
                 </a:solidFill>
-                <a:latin typeface="Times New Roman"/>
-                <a:cs typeface="Times New Roman"/>
+                <a:latin typeface="Calibri"/>
+                <a:cs typeface="Calibri"/>
               </a:rPr>
               <a:t> </a:t>
             </a:r>
@@ -3782,21 +3794,21 @@
           <a:p>
             <a:pPr algn="ctr"/>
             <a:r>
-              <a:rPr lang="en-US" sz="1300" dirty="0" smtClean="0">
+              <a:rPr lang="en-US" sz="1200" dirty="0" smtClean="0">
                 <a:solidFill>
                   <a:srgbClr val="000000"/>
                 </a:solidFill>
-                <a:latin typeface="Times New Roman"/>
-                <a:cs typeface="Times New Roman"/>
+                <a:latin typeface="Calibri"/>
+                <a:cs typeface="Calibri"/>
               </a:rPr>
               <a:t>interpolation and extrapolation</a:t>
             </a:r>
-            <a:endParaRPr lang="en-US" sz="1300" i="1" dirty="0">
+            <a:endParaRPr lang="en-US" sz="1200" i="1" dirty="0">
               <a:solidFill>
                 <a:srgbClr val="000000"/>
               </a:solidFill>
-              <a:latin typeface="Times New Roman"/>
-              <a:cs typeface="Times New Roman"/>
+              <a:latin typeface="Calibri"/>
+              <a:cs typeface="Calibri"/>
             </a:endParaRPr>
           </a:p>
         </p:txBody>
@@ -3812,8 +3824,8 @@
         </p:nvCxnSpPr>
         <p:spPr>
           <a:xfrm flipV="1">
-            <a:off x="4973095" y="3248488"/>
-            <a:ext cx="554490" cy="691514"/>
+            <a:off x="4751801" y="2177639"/>
+            <a:ext cx="294710" cy="1530776"/>
           </a:xfrm>
           <a:prstGeom prst="straightConnector1">
             <a:avLst/>
@@ -3852,8 +3864,8 @@
         </p:nvCxnSpPr>
         <p:spPr>
           <a:xfrm>
-            <a:off x="4926886" y="2235274"/>
-            <a:ext cx="600699" cy="1013214"/>
+            <a:off x="4289970" y="2055540"/>
+            <a:ext cx="756541" cy="122099"/>
           </a:xfrm>
           <a:prstGeom prst="straightConnector1">
             <a:avLst/>
@@ -3889,8 +3901,8 @@
         </p:nvSpPr>
         <p:spPr>
           <a:xfrm>
-            <a:off x="5273613" y="5118085"/>
-            <a:ext cx="1533599" cy="1356537"/>
+            <a:off x="4061310" y="5263548"/>
+            <a:ext cx="1326712" cy="1124676"/>
           </a:xfrm>
           <a:prstGeom prst="rect">
             <a:avLst/>
@@ -3929,8 +3941,8 @@
                 <a:solidFill>
                   <a:srgbClr val="000000"/>
                 </a:solidFill>
-                <a:latin typeface="Times New Roman"/>
-                <a:cs typeface="Times New Roman"/>
+                <a:latin typeface="Calibri"/>
+                <a:cs typeface="Calibri"/>
               </a:rPr>
               <a:t>Spatial Proxy &amp; Emissions Data</a:t>
             </a:r>
@@ -3938,8 +3950,8 @@
               <a:solidFill>
                 <a:srgbClr val="000000"/>
               </a:solidFill>
-              <a:latin typeface="Times New Roman"/>
-              <a:cs typeface="Times New Roman"/>
+              <a:latin typeface="Calibri"/>
+              <a:cs typeface="Calibri"/>
             </a:endParaRPr>
           </a:p>
         </p:txBody>
@@ -3952,7 +3964,7 @@
         </p:nvSpPr>
         <p:spPr>
           <a:xfrm>
-            <a:off x="7335391" y="417204"/>
+            <a:off x="7335391" y="169297"/>
             <a:ext cx="1533599" cy="1390228"/>
           </a:xfrm>
           <a:prstGeom prst="rect">
@@ -3988,21 +4000,41 @@
           <a:p>
             <a:pPr algn="ctr"/>
             <a:r>
-              <a:rPr lang="en-US" sz="1300" b="1" dirty="0" smtClean="0">
+              <a:rPr lang="en-US" sz="1200" b="1" dirty="0">
                 <a:solidFill>
                   <a:srgbClr val="000000"/>
                 </a:solidFill>
-                <a:latin typeface="Times New Roman"/>
-                <a:cs typeface="Times New Roman"/>
+                <a:latin typeface="Calibri"/>
+                <a:cs typeface="Calibri"/>
               </a:rPr>
-              <a:t>H. Uncertainty Estimates</a:t>
-            </a:r>
-            <a:endParaRPr lang="en-US" sz="1300" b="1" i="1" dirty="0">
+              <a:t>I</a:t>
+            </a:r>
+            <a:r>
+              <a:rPr lang="en-US" sz="1200" b="1" dirty="0" smtClean="0">
+                <a:solidFill>
+                  <a:srgbClr val="000000"/>
+                </a:solidFill>
+                <a:latin typeface="Calibri"/>
+                <a:cs typeface="Calibri"/>
+              </a:rPr>
+              <a:t>. </a:t>
+            </a:r>
+            <a:r>
+              <a:rPr lang="en-US" sz="1200" b="1" dirty="0" smtClean="0">
+                <a:solidFill>
+                  <a:srgbClr val="000000"/>
+                </a:solidFill>
+                <a:latin typeface="Calibri"/>
+                <a:cs typeface="Calibri"/>
+              </a:rPr>
+              <a:t>Uncertainty Estimates</a:t>
+            </a:r>
+            <a:endParaRPr lang="en-US" sz="1200" b="1" i="1" dirty="0">
               <a:solidFill>
                 <a:srgbClr val="000000"/>
               </a:solidFill>
-              <a:latin typeface="Times New Roman"/>
-              <a:cs typeface="Times New Roman"/>
+              <a:latin typeface="Calibri"/>
+              <a:cs typeface="Calibri"/>
             </a:endParaRPr>
           </a:p>
         </p:txBody>
@@ -4015,7 +4047,7 @@
         </p:nvSpPr>
         <p:spPr>
           <a:xfrm>
-            <a:off x="7335391" y="5127530"/>
+            <a:off x="7335391" y="5147617"/>
             <a:ext cx="1533599" cy="1356537"/>
           </a:xfrm>
           <a:prstGeom prst="rect">
@@ -4051,12 +4083,12 @@
           <a:p>
             <a:pPr algn="ctr"/>
             <a:r>
-              <a:rPr lang="en-US" sz="1300" b="1" dirty="0" smtClean="0">
+              <a:rPr lang="en-US" sz="1200" b="1" dirty="0" smtClean="0">
                 <a:solidFill>
                   <a:srgbClr val="000000"/>
                 </a:solidFill>
-                <a:latin typeface="Times New Roman"/>
-                <a:cs typeface="Times New Roman"/>
+                <a:latin typeface="Calibri"/>
+                <a:cs typeface="Calibri"/>
               </a:rPr>
               <a:t>G. Emissions </a:t>
             </a:r>
@@ -4064,21 +4096,21 @@
           <a:p>
             <a:pPr algn="ctr"/>
             <a:r>
-              <a:rPr lang="en-US" sz="1300" b="1" dirty="0" smtClean="0">
+              <a:rPr lang="en-US" sz="1200" b="1" dirty="0" smtClean="0">
                 <a:solidFill>
                   <a:srgbClr val="000000"/>
                 </a:solidFill>
-                <a:latin typeface="Times New Roman"/>
-                <a:cs typeface="Times New Roman"/>
+                <a:latin typeface="Calibri"/>
+                <a:cs typeface="Calibri"/>
               </a:rPr>
               <a:t>Gridding</a:t>
             </a:r>
-            <a:endParaRPr lang="en-US" sz="1300" b="1" i="1" dirty="0">
+            <a:endParaRPr lang="en-US" sz="1200" b="1" i="1" dirty="0">
               <a:solidFill>
                 <a:srgbClr val="000000"/>
               </a:solidFill>
-              <a:latin typeface="Times New Roman"/>
-              <a:cs typeface="Times New Roman"/>
+              <a:latin typeface="Calibri"/>
+              <a:cs typeface="Calibri"/>
             </a:endParaRPr>
           </a:p>
         </p:txBody>
@@ -4091,7 +4123,7 @@
         </p:nvSpPr>
         <p:spPr>
           <a:xfrm>
-            <a:off x="7288006" y="2593019"/>
+            <a:off x="7288006" y="2690106"/>
             <a:ext cx="1628369" cy="1310938"/>
           </a:xfrm>
           <a:prstGeom prst="rect">
@@ -4130,12 +4162,12 @@
           <a:p>
             <a:pPr algn="ctr"/>
             <a:r>
-              <a:rPr lang="en-US" sz="1300" b="1" dirty="0" smtClean="0">
+              <a:rPr lang="en-US" sz="1200" b="1" dirty="0" smtClean="0">
                 <a:solidFill>
                   <a:srgbClr val="000000"/>
                 </a:solidFill>
-                <a:latin typeface="Times New Roman"/>
-                <a:cs typeface="Times New Roman"/>
+                <a:latin typeface="Calibri"/>
+                <a:cs typeface="Calibri"/>
               </a:rPr>
               <a:t>Final Emissions</a:t>
             </a:r>
@@ -4143,21 +4175,21 @@
           <a:p>
             <a:pPr algn="ctr"/>
             <a:r>
-              <a:rPr lang="en-US" sz="1300" dirty="0" smtClean="0">
+              <a:rPr lang="en-US" sz="1200" dirty="0" smtClean="0">
                 <a:solidFill>
                   <a:srgbClr val="000000"/>
                 </a:solidFill>
-                <a:latin typeface="Times New Roman"/>
-                <a:cs typeface="Times New Roman"/>
+                <a:latin typeface="Calibri"/>
+                <a:cs typeface="Calibri"/>
               </a:rPr>
               <a:t>by country, year, fuel, process, and sector</a:t>
             </a:r>
-            <a:endParaRPr lang="en-US" sz="1300" i="1" dirty="0">
+            <a:endParaRPr lang="en-US" sz="1200" i="1" dirty="0">
               <a:solidFill>
                 <a:srgbClr val="000000"/>
               </a:solidFill>
-              <a:latin typeface="Times New Roman"/>
-              <a:cs typeface="Times New Roman"/>
+              <a:latin typeface="Calibri"/>
+              <a:cs typeface="Calibri"/>
             </a:endParaRPr>
           </a:p>
         </p:txBody>
@@ -4173,8 +4205,8 @@
         </p:nvCxnSpPr>
         <p:spPr>
           <a:xfrm>
-            <a:off x="6807212" y="5796354"/>
-            <a:ext cx="528179" cy="9445"/>
+            <a:off x="5388022" y="5825886"/>
+            <a:ext cx="1947369" cy="0"/>
           </a:xfrm>
           <a:prstGeom prst="straightConnector1">
             <a:avLst/>
@@ -4206,15 +4238,15 @@
         <p:nvCxnSpPr>
           <p:cNvPr id="131" name="Straight Arrow Connector 130"/>
           <p:cNvCxnSpPr>
-            <a:stCxn id="47" idx="3"/>
+            <a:stCxn id="110" idx="3"/>
             <a:endCxn id="66" idx="1"/>
           </p:cNvCxnSpPr>
           <p:nvPr/>
         </p:nvCxnSpPr>
         <p:spPr>
-          <a:xfrm>
-            <a:off x="6807212" y="3248488"/>
-            <a:ext cx="480794" cy="0"/>
+          <a:xfrm flipV="1">
+            <a:off x="6523327" y="3345575"/>
+            <a:ext cx="764679" cy="583295"/>
           </a:xfrm>
           <a:prstGeom prst="straightConnector1">
             <a:avLst/>
@@ -4253,8 +4285,8 @@
         </p:nvCxnSpPr>
         <p:spPr>
           <a:xfrm>
-            <a:off x="2491396" y="1112318"/>
-            <a:ext cx="4843995" cy="0"/>
+            <a:off x="1799214" y="860932"/>
+            <a:ext cx="5536177" cy="3479"/>
           </a:xfrm>
           <a:prstGeom prst="straightConnector1">
             <a:avLst/>
@@ -4293,8 +4325,8 @@
         </p:nvCxnSpPr>
         <p:spPr>
           <a:xfrm flipV="1">
-            <a:off x="8102191" y="1807432"/>
-            <a:ext cx="0" cy="785587"/>
+            <a:off x="8102191" y="1559525"/>
+            <a:ext cx="0" cy="1130581"/>
           </a:xfrm>
           <a:prstGeom prst="straightConnector1">
             <a:avLst/>
@@ -4333,8 +4365,8 @@
         </p:nvCxnSpPr>
         <p:spPr>
           <a:xfrm>
-            <a:off x="8102191" y="3903957"/>
-            <a:ext cx="0" cy="1223573"/>
+            <a:off x="8102191" y="4001044"/>
+            <a:ext cx="0" cy="1146573"/>
           </a:xfrm>
           <a:prstGeom prst="straightConnector1">
             <a:avLst/>
@@ -4370,8 +4402,8 @@
         </p:nvSpPr>
         <p:spPr>
           <a:xfrm rot="21149204">
-            <a:off x="274319" y="2005823"/>
-            <a:ext cx="864703" cy="3135386"/>
+            <a:off x="249488" y="1627646"/>
+            <a:ext cx="977913" cy="3507760"/>
           </a:xfrm>
           <a:custGeom>
             <a:avLst/>
@@ -4456,8 +4488,8 @@
         </p:nvCxnSpPr>
         <p:spPr>
           <a:xfrm>
-            <a:off x="2692388" y="5792185"/>
-            <a:ext cx="2581225" cy="4169"/>
+            <a:off x="2578019" y="5825886"/>
+            <a:ext cx="1483291" cy="0"/>
           </a:xfrm>
           <a:prstGeom prst="straightConnector1">
             <a:avLst/>
@@ -4490,14 +4522,14 @@
           <p:cNvPr id="26" name="Straight Arrow Connector 25"/>
           <p:cNvCxnSpPr>
             <a:stCxn id="6" idx="1"/>
-            <a:endCxn id="11" idx="3"/>
+            <a:endCxn id="11" idx="0"/>
           </p:cNvCxnSpPr>
           <p:nvPr/>
         </p:nvCxnSpPr>
         <p:spPr>
           <a:xfrm flipH="1">
-            <a:off x="2692388" y="2235274"/>
-            <a:ext cx="756994" cy="3556911"/>
+            <a:off x="1658462" y="2055540"/>
+            <a:ext cx="1154004" cy="3049378"/>
           </a:xfrm>
           <a:prstGeom prst="straightConnector1">
             <a:avLst/>
@@ -4536,8 +4568,8 @@
         </p:nvCxnSpPr>
         <p:spPr>
           <a:xfrm flipH="1">
-            <a:off x="1772831" y="2235274"/>
-            <a:ext cx="1676551" cy="689741"/>
+            <a:off x="1451056" y="2055540"/>
+            <a:ext cx="1361410" cy="696045"/>
           </a:xfrm>
           <a:prstGeom prst="straightConnector1">
             <a:avLst/>
@@ -4577,8 +4609,131 @@
         </p:nvCxnSpPr>
         <p:spPr>
           <a:xfrm>
-            <a:off x="1388071" y="1963816"/>
-            <a:ext cx="384760" cy="961199"/>
+            <a:off x="993873" y="1549124"/>
+            <a:ext cx="457183" cy="1202461"/>
+          </a:xfrm>
+          <a:prstGeom prst="straightConnector1">
+            <a:avLst/>
+          </a:prstGeom>
+          <a:ln>
+            <a:solidFill>
+              <a:srgbClr val="000000"/>
+            </a:solidFill>
+            <a:tailEnd type="arrow"/>
+          </a:ln>
+          <a:effectLst/>
+        </p:spPr>
+        <p:style>
+          <a:lnRef idx="2">
+            <a:schemeClr val="accent1"/>
+          </a:lnRef>
+          <a:fillRef idx="0">
+            <a:schemeClr val="accent1"/>
+          </a:fillRef>
+          <a:effectRef idx="1">
+            <a:schemeClr val="accent1"/>
+          </a:effectRef>
+          <a:fontRef idx="minor">
+            <a:schemeClr val="tx1"/>
+          </a:fontRef>
+        </p:style>
+      </p:cxnSp>
+      <p:sp>
+        <p:nvSpPr>
+          <p:cNvPr id="110" name="Rectangle 109"/>
+          <p:cNvSpPr/>
+          <p:nvPr/>
+        </p:nvSpPr>
+        <p:spPr>
+          <a:xfrm>
+            <a:off x="5243700" y="3330001"/>
+            <a:ext cx="1279627" cy="1197738"/>
+          </a:xfrm>
+          <a:prstGeom prst="rect">
+            <a:avLst/>
+          </a:prstGeom>
+          <a:solidFill>
+            <a:schemeClr val="accent3">
+              <a:lumMod val="20000"/>
+              <a:lumOff val="80000"/>
+            </a:schemeClr>
+          </a:solidFill>
+          <a:ln/>
+        </p:spPr>
+        <p:style>
+          <a:lnRef idx="2">
+            <a:schemeClr val="accent3">
+              <a:shade val="50000"/>
+            </a:schemeClr>
+          </a:lnRef>
+          <a:fillRef idx="1">
+            <a:schemeClr val="accent3"/>
+          </a:fillRef>
+          <a:effectRef idx="0">
+            <a:schemeClr val="accent3"/>
+          </a:effectRef>
+          <a:fontRef idx="minor">
+            <a:schemeClr val="lt1"/>
+          </a:fontRef>
+        </p:style>
+        <p:txBody>
+          <a:bodyPr rtlCol="0" anchor="ctr"/>
+          <a:lstStyle/>
+          <a:p>
+            <a:pPr algn="ctr"/>
+            <a:r>
+              <a:rPr lang="en-US" sz="1200" b="1" dirty="0" smtClean="0">
+                <a:solidFill>
+                  <a:srgbClr val="000000"/>
+                </a:solidFill>
+                <a:latin typeface="Calibri"/>
+                <a:cs typeface="Calibri"/>
+              </a:rPr>
+              <a:t>H. Historical Extension</a:t>
+            </a:r>
+            <a:endParaRPr lang="en-US" sz="1200" dirty="0" smtClean="0">
+              <a:solidFill>
+                <a:srgbClr val="000000"/>
+              </a:solidFill>
+              <a:latin typeface="Calibri"/>
+              <a:cs typeface="Calibri"/>
+            </a:endParaRPr>
+          </a:p>
+          <a:p>
+            <a:pPr algn="ctr"/>
+            <a:r>
+              <a:rPr lang="en-US" sz="1200" dirty="0" smtClean="0">
+                <a:solidFill>
+                  <a:srgbClr val="000000"/>
+                </a:solidFill>
+                <a:latin typeface="Calibri"/>
+                <a:cs typeface="Calibri"/>
+              </a:rPr>
+              <a:t>activity data and emission factors</a:t>
+            </a:r>
+            <a:endParaRPr lang="en-US" sz="1200" i="1" dirty="0">
+              <a:solidFill>
+                <a:srgbClr val="000000"/>
+              </a:solidFill>
+              <a:latin typeface="Calibri"/>
+              <a:cs typeface="Calibri"/>
+            </a:endParaRPr>
+          </a:p>
+        </p:txBody>
+      </p:sp>
+      <p:cxnSp>
+        <p:nvCxnSpPr>
+          <p:cNvPr id="112" name="Straight Arrow Connector 111"/>
+          <p:cNvCxnSpPr>
+            <a:stCxn id="47" idx="2"/>
+            <a:endCxn id="110" idx="0"/>
+          </p:cNvCxnSpPr>
+          <p:nvPr/>
+        </p:nvCxnSpPr>
+        <p:spPr>
+          <a:xfrm>
+            <a:off x="5686325" y="2776508"/>
+            <a:ext cx="197189" cy="553493"/>
           </a:xfrm>
           <a:prstGeom prst="straightConnector1">
             <a:avLst/>

</xml_diff>

<commit_message>
update flow chart to include seasonality box into gridding box
</commit_message>
<xml_diff>
--- a/documentation/CEDS Module Flow Chart.pptx
+++ b/documentation/CEDS Module Flow Chart.pptx
@@ -288,7 +288,7 @@
           <a:p>
             <a:fld id="{B0D19113-2CE2-D44F-AE8E-C04F05A7C2E1}" type="datetimeFigureOut">
               <a:rPr lang="en-US" smtClean="0"/>
-              <a:t>6/22/16</a:t>
+              <a:t>3/7/17</a:t>
             </a:fld>
             <a:endParaRPr lang="en-US"/>
           </a:p>
@@ -458,7 +458,7 @@
           <a:p>
             <a:fld id="{B0D19113-2CE2-D44F-AE8E-C04F05A7C2E1}" type="datetimeFigureOut">
               <a:rPr lang="en-US" smtClean="0"/>
-              <a:t>6/22/16</a:t>
+              <a:t>3/7/17</a:t>
             </a:fld>
             <a:endParaRPr lang="en-US"/>
           </a:p>
@@ -638,7 +638,7 @@
           <a:p>
             <a:fld id="{B0D19113-2CE2-D44F-AE8E-C04F05A7C2E1}" type="datetimeFigureOut">
               <a:rPr lang="en-US" smtClean="0"/>
-              <a:t>6/22/16</a:t>
+              <a:t>3/7/17</a:t>
             </a:fld>
             <a:endParaRPr lang="en-US"/>
           </a:p>
@@ -808,7 +808,7 @@
           <a:p>
             <a:fld id="{B0D19113-2CE2-D44F-AE8E-C04F05A7C2E1}" type="datetimeFigureOut">
               <a:rPr lang="en-US" smtClean="0"/>
-              <a:t>6/22/16</a:t>
+              <a:t>3/7/17</a:t>
             </a:fld>
             <a:endParaRPr lang="en-US"/>
           </a:p>
@@ -1054,7 +1054,7 @@
           <a:p>
             <a:fld id="{B0D19113-2CE2-D44F-AE8E-C04F05A7C2E1}" type="datetimeFigureOut">
               <a:rPr lang="en-US" smtClean="0"/>
-              <a:t>6/22/16</a:t>
+              <a:t>3/7/17</a:t>
             </a:fld>
             <a:endParaRPr lang="en-US"/>
           </a:p>
@@ -1342,7 +1342,7 @@
           <a:p>
             <a:fld id="{B0D19113-2CE2-D44F-AE8E-C04F05A7C2E1}" type="datetimeFigureOut">
               <a:rPr lang="en-US" smtClean="0"/>
-              <a:t>6/22/16</a:t>
+              <a:t>3/7/17</a:t>
             </a:fld>
             <a:endParaRPr lang="en-US"/>
           </a:p>
@@ -1764,7 +1764,7 @@
           <a:p>
             <a:fld id="{B0D19113-2CE2-D44F-AE8E-C04F05A7C2E1}" type="datetimeFigureOut">
               <a:rPr lang="en-US" smtClean="0"/>
-              <a:t>6/22/16</a:t>
+              <a:t>3/7/17</a:t>
             </a:fld>
             <a:endParaRPr lang="en-US"/>
           </a:p>
@@ -1882,7 +1882,7 @@
           <a:p>
             <a:fld id="{B0D19113-2CE2-D44F-AE8E-C04F05A7C2E1}" type="datetimeFigureOut">
               <a:rPr lang="en-US" smtClean="0"/>
-              <a:t>6/22/16</a:t>
+              <a:t>3/7/17</a:t>
             </a:fld>
             <a:endParaRPr lang="en-US"/>
           </a:p>
@@ -1977,7 +1977,7 @@
           <a:p>
             <a:fld id="{B0D19113-2CE2-D44F-AE8E-C04F05A7C2E1}" type="datetimeFigureOut">
               <a:rPr lang="en-US" smtClean="0"/>
-              <a:t>6/22/16</a:t>
+              <a:t>3/7/17</a:t>
             </a:fld>
             <a:endParaRPr lang="en-US"/>
           </a:p>
@@ -2254,7 +2254,7 @@
           <a:p>
             <a:fld id="{B0D19113-2CE2-D44F-AE8E-C04F05A7C2E1}" type="datetimeFigureOut">
               <a:rPr lang="en-US" smtClean="0"/>
-              <a:t>6/22/16</a:t>
+              <a:t>3/7/17</a:t>
             </a:fld>
             <a:endParaRPr lang="en-US"/>
           </a:p>
@@ -2507,7 +2507,7 @@
           <a:p>
             <a:fld id="{B0D19113-2CE2-D44F-AE8E-C04F05A7C2E1}" type="datetimeFigureOut">
               <a:rPr lang="en-US" smtClean="0"/>
-              <a:t>6/22/16</a:t>
+              <a:t>3/7/17</a:t>
             </a:fld>
             <a:endParaRPr lang="en-US"/>
           </a:p>
@@ -2720,7 +2720,7 @@
           <a:p>
             <a:fld id="{B0D19113-2CE2-D44F-AE8E-C04F05A7C2E1}" type="datetimeFigureOut">
               <a:rPr lang="en-US" smtClean="0"/>
-              <a:t>6/22/16</a:t>
+              <a:t>3/7/17</a:t>
             </a:fld>
             <a:endParaRPr lang="en-US"/>
           </a:p>
@@ -3106,8 +3106,8 @@
         </p:nvCxnSpPr>
         <p:spPr>
           <a:xfrm>
-            <a:off x="2259422" y="3376315"/>
-            <a:ext cx="1801888" cy="2449571"/>
+            <a:off x="2260900" y="3186026"/>
+            <a:ext cx="1800410" cy="2639860"/>
           </a:xfrm>
           <a:prstGeom prst="straightConnector1">
             <a:avLst/>
@@ -3227,25 +3227,7 @@
                 </a:solidFill>
                 <a:cs typeface="Times New Roman"/>
               </a:rPr>
-              <a:t>(</a:t>
-            </a:r>
-            <a:r>
-              <a:rPr lang="en-US" sz="1200" dirty="0" smtClean="0">
-                <a:solidFill>
-                  <a:schemeClr val="tx1"/>
-                </a:solidFill>
-                <a:cs typeface="Times New Roman"/>
-              </a:rPr>
-              <a:t>1750 – </a:t>
-            </a:r>
-            <a:r>
-              <a:rPr lang="en-US" sz="1200" dirty="0" smtClean="0">
-                <a:solidFill>
-                  <a:schemeClr val="tx1"/>
-                </a:solidFill>
-                <a:cs typeface="Times New Roman"/>
-              </a:rPr>
-              <a:t>20xx)</a:t>
+              <a:t>(1750 – 20xx)</a:t>
             </a:r>
             <a:endParaRPr lang="en-US" sz="1200" dirty="0">
               <a:solidFill>
@@ -3264,7 +3246,7 @@
         </p:nvSpPr>
         <p:spPr>
           <a:xfrm>
-            <a:off x="2812466" y="1539228"/>
+            <a:off x="3160230" y="1224025"/>
             <a:ext cx="1477504" cy="1032623"/>
           </a:xfrm>
           <a:prstGeom prst="rect">
@@ -3350,7 +3332,7 @@
         </p:nvSpPr>
         <p:spPr>
           <a:xfrm>
-            <a:off x="642689" y="2751585"/>
+            <a:off x="644167" y="2561296"/>
             <a:ext cx="1616733" cy="1249459"/>
           </a:xfrm>
           <a:prstGeom prst="rect">
@@ -3638,8 +3620,8 @@
         </p:nvCxnSpPr>
         <p:spPr>
           <a:xfrm>
-            <a:off x="2259422" y="3376315"/>
-            <a:ext cx="900808" cy="332100"/>
+            <a:off x="2260900" y="3186026"/>
+            <a:ext cx="899330" cy="522389"/>
           </a:xfrm>
           <a:prstGeom prst="straightConnector1">
             <a:avLst/>
@@ -3715,8 +3697,8 @@
         </p:nvSpPr>
         <p:spPr>
           <a:xfrm>
-            <a:off x="5046511" y="1578770"/>
-            <a:ext cx="1279627" cy="1197738"/>
+            <a:off x="5428257" y="1224025"/>
+            <a:ext cx="1279627" cy="1032623"/>
           </a:xfrm>
           <a:prstGeom prst="rect">
             <a:avLst/>
@@ -3824,8 +3806,8 @@
         </p:nvCxnSpPr>
         <p:spPr>
           <a:xfrm flipV="1">
-            <a:off x="4751801" y="2177639"/>
-            <a:ext cx="294710" cy="1530776"/>
+            <a:off x="4751801" y="1740337"/>
+            <a:ext cx="676456" cy="1968078"/>
           </a:xfrm>
           <a:prstGeom prst="straightConnector1">
             <a:avLst/>
@@ -3864,8 +3846,8 @@
         </p:nvCxnSpPr>
         <p:spPr>
           <a:xfrm>
-            <a:off x="4289970" y="2055540"/>
-            <a:ext cx="756541" cy="122099"/>
+            <a:off x="4637734" y="1740337"/>
+            <a:ext cx="790523" cy="0"/>
           </a:xfrm>
           <a:prstGeom prst="straightConnector1">
             <a:avLst/>
@@ -4017,17 +3999,7 @@
                 <a:latin typeface="Calibri"/>
                 <a:cs typeface="Calibri"/>
               </a:rPr>
-              <a:t>. </a:t>
-            </a:r>
-            <a:r>
-              <a:rPr lang="en-US" sz="1200" b="1" dirty="0" smtClean="0">
-                <a:solidFill>
-                  <a:srgbClr val="000000"/>
-                </a:solidFill>
-                <a:latin typeface="Calibri"/>
-                <a:cs typeface="Calibri"/>
-              </a:rPr>
-              <a:t>Uncertainty Estimates</a:t>
+              <a:t>. Uncertainty Estimates</a:t>
             </a:r>
             <a:endParaRPr lang="en-US" sz="1200" b="1" i="1" dirty="0">
               <a:solidFill>
@@ -4047,7 +4019,7 @@
         </p:nvSpPr>
         <p:spPr>
           <a:xfrm>
-            <a:off x="7335391" y="5147617"/>
+            <a:off x="7335531" y="5147617"/>
             <a:ext cx="1533599" cy="1356537"/>
           </a:xfrm>
           <a:prstGeom prst="rect">
@@ -4123,7 +4095,7 @@
         </p:nvSpPr>
         <p:spPr>
           <a:xfrm>
-            <a:off x="7288006" y="2690106"/>
+            <a:off x="7288006" y="3007206"/>
             <a:ext cx="1628369" cy="1310938"/>
           </a:xfrm>
           <a:prstGeom prst="rect">
@@ -4206,7 +4178,7 @@
         <p:spPr>
           <a:xfrm>
             <a:off x="5388022" y="5825886"/>
-            <a:ext cx="1947369" cy="0"/>
+            <a:ext cx="1947509" cy="0"/>
           </a:xfrm>
           <a:prstGeom prst="straightConnector1">
             <a:avLst/>
@@ -4244,9 +4216,9 @@
           <p:nvPr/>
         </p:nvCxnSpPr>
         <p:spPr>
-          <a:xfrm flipV="1">
-            <a:off x="6523327" y="3345575"/>
-            <a:ext cx="764679" cy="583295"/>
+          <a:xfrm>
+            <a:off x="6707884" y="3662675"/>
+            <a:ext cx="580122" cy="0"/>
           </a:xfrm>
           <a:prstGeom prst="straightConnector1">
             <a:avLst/>
@@ -4326,7 +4298,7 @@
         <p:spPr>
           <a:xfrm flipV="1">
             <a:off x="8102191" y="1559525"/>
-            <a:ext cx="0" cy="1130581"/>
+            <a:ext cx="0" cy="1447681"/>
           </a:xfrm>
           <a:prstGeom prst="straightConnector1">
             <a:avLst/>
@@ -4365,8 +4337,8 @@
         </p:nvCxnSpPr>
         <p:spPr>
           <a:xfrm>
-            <a:off x="8102191" y="4001044"/>
-            <a:ext cx="0" cy="1146573"/>
+            <a:off x="8102191" y="4318144"/>
+            <a:ext cx="140" cy="829473"/>
           </a:xfrm>
           <a:prstGeom prst="straightConnector1">
             <a:avLst/>
@@ -4520,16 +4492,13 @@
       <p:cxnSp>
         <p:nvCxnSpPr>
           <p:cNvPr id="26" name="Straight Arrow Connector 25"/>
-          <p:cNvCxnSpPr>
-            <a:stCxn id="6" idx="1"/>
-            <a:endCxn id="11" idx="0"/>
-          </p:cNvCxnSpPr>
+          <p:cNvCxnSpPr/>
           <p:nvPr/>
         </p:nvCxnSpPr>
         <p:spPr>
           <a:xfrm flipH="1">
-            <a:off x="1658462" y="2055540"/>
-            <a:ext cx="1154004" cy="3049378"/>
+            <a:off x="2005080" y="2256648"/>
+            <a:ext cx="1155150" cy="2848270"/>
           </a:xfrm>
           <a:prstGeom prst="straightConnector1">
             <a:avLst/>
@@ -4568,8 +4537,8 @@
         </p:nvCxnSpPr>
         <p:spPr>
           <a:xfrm flipH="1">
-            <a:off x="1451056" y="2055540"/>
-            <a:ext cx="1361410" cy="696045"/>
+            <a:off x="1452534" y="1740337"/>
+            <a:ext cx="1707696" cy="820959"/>
           </a:xfrm>
           <a:prstGeom prst="straightConnector1">
             <a:avLst/>
@@ -4610,7 +4579,7 @@
         <p:spPr>
           <a:xfrm>
             <a:off x="993873" y="1549124"/>
-            <a:ext cx="457183" cy="1202461"/>
+            <a:ext cx="458661" cy="1012172"/>
           </a:xfrm>
           <a:prstGeom prst="straightConnector1">
             <a:avLst/>
@@ -4646,7 +4615,7 @@
         </p:nvSpPr>
         <p:spPr>
           <a:xfrm>
-            <a:off x="5243700" y="3330001"/>
+            <a:off x="5428257" y="3063806"/>
             <a:ext cx="1279627" cy="1197738"/>
           </a:xfrm>
           <a:prstGeom prst="rect">
@@ -4732,8 +4701,111 @@
         </p:nvCxnSpPr>
         <p:spPr>
           <a:xfrm>
-            <a:off x="5686325" y="2776508"/>
-            <a:ext cx="197189" cy="553493"/>
+            <a:off x="6068071" y="2256648"/>
+            <a:ext cx="0" cy="807158"/>
+          </a:xfrm>
+          <a:prstGeom prst="straightConnector1">
+            <a:avLst/>
+          </a:prstGeom>
+          <a:ln>
+            <a:solidFill>
+              <a:srgbClr val="000000"/>
+            </a:solidFill>
+            <a:tailEnd type="arrow"/>
+          </a:ln>
+          <a:effectLst/>
+        </p:spPr>
+        <p:style>
+          <a:lnRef idx="2">
+            <a:schemeClr val="accent1"/>
+          </a:lnRef>
+          <a:fillRef idx="0">
+            <a:schemeClr val="accent1"/>
+          </a:fillRef>
+          <a:effectRef idx="1">
+            <a:schemeClr val="accent1"/>
+          </a:effectRef>
+          <a:fontRef idx="minor">
+            <a:schemeClr val="tx1"/>
+          </a:fontRef>
+        </p:style>
+      </p:cxnSp>
+      <p:sp>
+        <p:nvSpPr>
+          <p:cNvPr id="34" name="Rectangle 33"/>
+          <p:cNvSpPr/>
+          <p:nvPr/>
+        </p:nvSpPr>
+        <p:spPr>
+          <a:xfrm>
+            <a:off x="5536086" y="4698384"/>
+            <a:ext cx="1171798" cy="597999"/>
+          </a:xfrm>
+          <a:prstGeom prst="rect">
+            <a:avLst/>
+          </a:prstGeom>
+          <a:solidFill>
+            <a:schemeClr val="accent1">
+              <a:lumMod val="20000"/>
+              <a:lumOff val="80000"/>
+            </a:schemeClr>
+          </a:solidFill>
+          <a:ln/>
+        </p:spPr>
+        <p:style>
+          <a:lnRef idx="2">
+            <a:schemeClr val="accent1">
+              <a:shade val="50000"/>
+            </a:schemeClr>
+          </a:lnRef>
+          <a:fillRef idx="1">
+            <a:schemeClr val="accent1"/>
+          </a:fillRef>
+          <a:effectRef idx="0">
+            <a:schemeClr val="accent1"/>
+          </a:effectRef>
+          <a:fontRef idx="minor">
+            <a:schemeClr val="lt1"/>
+          </a:fontRef>
+        </p:style>
+        <p:txBody>
+          <a:bodyPr rtlCol="0" anchor="ctr"/>
+          <a:lstStyle/>
+          <a:p>
+            <a:pPr algn="ctr"/>
+            <a:r>
+              <a:rPr lang="en-US" sz="1300" dirty="0" smtClean="0">
+                <a:solidFill>
+                  <a:srgbClr val="000000"/>
+                </a:solidFill>
+                <a:latin typeface="Calibri"/>
+                <a:cs typeface="Calibri"/>
+              </a:rPr>
+              <a:t>Seasonality</a:t>
+            </a:r>
+            <a:endParaRPr lang="en-US" sz="1300" i="1" dirty="0">
+              <a:solidFill>
+                <a:srgbClr val="000000"/>
+              </a:solidFill>
+              <a:latin typeface="Calibri"/>
+              <a:cs typeface="Calibri"/>
+            </a:endParaRPr>
+          </a:p>
+        </p:txBody>
+      </p:sp>
+      <p:cxnSp>
+        <p:nvCxnSpPr>
+          <p:cNvPr id="36" name="Straight Arrow Connector 35"/>
+          <p:cNvCxnSpPr>
+            <a:stCxn id="34" idx="2"/>
+            <a:endCxn id="65" idx="1"/>
+          </p:cNvCxnSpPr>
+          <p:nvPr/>
+        </p:nvCxnSpPr>
+        <p:spPr>
+          <a:xfrm>
+            <a:off x="6121985" y="5296383"/>
+            <a:ext cx="1213546" cy="529503"/>
           </a:xfrm>
           <a:prstGeom prst="straightConnector1">
             <a:avLst/>

</xml_diff>